<commit_message>
Refined some of the Scala tutorial presentations.
</commit_message>
<xml_diff>
--- a/tutorials/Scala/presentations/10_Immutability.pptx
+++ b/tutorials/Scala/presentations/10_Immutability.pptx
@@ -312,7 +312,7 @@
             <a:fld id="{1D8BD707-D9CF-40AE-B4C6-C98DA3205C09}" type="datetimeFigureOut">
               <a:rPr lang="en-US" smtClean="0"/>
               <a:pPr/>
-              <a:t>2025-01-25</a:t>
+              <a:t>2025-01-30</a:t>
             </a:fld>
             <a:endParaRPr lang="en-US"/>
           </a:p>
@@ -477,7 +477,7 @@
             <a:fld id="{1D8BD707-D9CF-40AE-B4C6-C98DA3205C09}" type="datetimeFigureOut">
               <a:rPr lang="en-US" smtClean="0"/>
               <a:pPr/>
-              <a:t>2025-01-25</a:t>
+              <a:t>2025-01-30</a:t>
             </a:fld>
             <a:endParaRPr lang="en-US"/>
           </a:p>
@@ -652,7 +652,7 @@
             <a:fld id="{1D8BD707-D9CF-40AE-B4C6-C98DA3205C09}" type="datetimeFigureOut">
               <a:rPr lang="en-US" smtClean="0"/>
               <a:pPr/>
-              <a:t>2025-01-25</a:t>
+              <a:t>2025-01-30</a:t>
             </a:fld>
             <a:endParaRPr lang="en-US"/>
           </a:p>
@@ -817,7 +817,7 @@
             <a:fld id="{1D8BD707-D9CF-40AE-B4C6-C98DA3205C09}" type="datetimeFigureOut">
               <a:rPr lang="en-US" smtClean="0"/>
               <a:pPr/>
-              <a:t>2025-01-25</a:t>
+              <a:t>2025-01-30</a:t>
             </a:fld>
             <a:endParaRPr lang="en-US"/>
           </a:p>
@@ -1059,7 +1059,7 @@
             <a:fld id="{1D8BD707-D9CF-40AE-B4C6-C98DA3205C09}" type="datetimeFigureOut">
               <a:rPr lang="en-US" smtClean="0"/>
               <a:pPr/>
-              <a:t>2025-01-25</a:t>
+              <a:t>2025-01-30</a:t>
             </a:fld>
             <a:endParaRPr lang="en-US"/>
           </a:p>
@@ -1341,7 +1341,7 @@
             <a:fld id="{1D8BD707-D9CF-40AE-B4C6-C98DA3205C09}" type="datetimeFigureOut">
               <a:rPr lang="en-US" smtClean="0"/>
               <a:pPr/>
-              <a:t>2025-01-25</a:t>
+              <a:t>2025-01-30</a:t>
             </a:fld>
             <a:endParaRPr lang="en-US"/>
           </a:p>
@@ -1757,7 +1757,7 @@
             <a:fld id="{1D8BD707-D9CF-40AE-B4C6-C98DA3205C09}" type="datetimeFigureOut">
               <a:rPr lang="en-US" smtClean="0"/>
               <a:pPr/>
-              <a:t>2025-01-25</a:t>
+              <a:t>2025-01-30</a:t>
             </a:fld>
             <a:endParaRPr lang="en-US"/>
           </a:p>
@@ -1871,7 +1871,7 @@
             <a:fld id="{1D8BD707-D9CF-40AE-B4C6-C98DA3205C09}" type="datetimeFigureOut">
               <a:rPr lang="en-US" smtClean="0"/>
               <a:pPr/>
-              <a:t>2025-01-25</a:t>
+              <a:t>2025-01-30</a:t>
             </a:fld>
             <a:endParaRPr lang="en-US"/>
           </a:p>
@@ -1963,7 +1963,7 @@
             <a:fld id="{1D8BD707-D9CF-40AE-B4C6-C98DA3205C09}" type="datetimeFigureOut">
               <a:rPr lang="en-US" smtClean="0"/>
               <a:pPr/>
-              <a:t>2025-01-25</a:t>
+              <a:t>2025-01-30</a:t>
             </a:fld>
             <a:endParaRPr lang="en-US"/>
           </a:p>
@@ -2235,7 +2235,7 @@
             <a:fld id="{1D8BD707-D9CF-40AE-B4C6-C98DA3205C09}" type="datetimeFigureOut">
               <a:rPr lang="en-US" smtClean="0"/>
               <a:pPr/>
-              <a:t>2025-01-25</a:t>
+              <a:t>2025-01-30</a:t>
             </a:fld>
             <a:endParaRPr lang="en-US"/>
           </a:p>
@@ -2484,7 +2484,7 @@
             <a:fld id="{1D8BD707-D9CF-40AE-B4C6-C98DA3205C09}" type="datetimeFigureOut">
               <a:rPr lang="en-US" smtClean="0"/>
               <a:pPr/>
-              <a:t>2025-01-25</a:t>
+              <a:t>2025-01-30</a:t>
             </a:fld>
             <a:endParaRPr lang="en-US"/>
           </a:p>
@@ -2692,7 +2692,7 @@
             <a:fld id="{1D8BD707-D9CF-40AE-B4C6-C98DA3205C09}" type="datetimeFigureOut">
               <a:rPr lang="en-US" smtClean="0"/>
               <a:pPr/>
-              <a:t>2025-01-25</a:t>
+              <a:t>2025-01-30</a:t>
             </a:fld>
             <a:endParaRPr lang="en-US"/>
           </a:p>
@@ -3102,18 +3102,13 @@
           <a:p>
             <a:r>
               <a:rPr lang="en-US" dirty="0"/>
-              <a:t>CIS-3030, Vermont </a:t>
-            </a:r>
-            <a:r>
-              <a:rPr lang="en-US"/>
-              <a:t>Technical College</a:t>
-            </a:r>
-            <a:endParaRPr lang="en-US" dirty="0"/>
+              <a:t>Peter Chapin</a:t>
+            </a:r>
           </a:p>
           <a:p>
             <a:r>
               <a:rPr lang="en-US" dirty="0"/>
-              <a:t>Peter C. Chapin</a:t>
+              <a:t>Vermont State University</a:t>
             </a:r>
           </a:p>
         </p:txBody>
@@ -3178,7 +3173,7 @@
         </p:nvSpPr>
         <p:spPr>
           <a:xfrm>
-            <a:off x="2686892" y="1680754"/>
+            <a:off x="2854046" y="1447618"/>
             <a:ext cx="1324465" cy="523220"/>
           </a:xfrm>
           <a:prstGeom prst="rect">
@@ -3207,7 +3202,7 @@
         </p:nvSpPr>
         <p:spPr>
           <a:xfrm>
-            <a:off x="7639892" y="1680754"/>
+            <a:off x="7807046" y="1447618"/>
             <a:ext cx="1103187" cy="523220"/>
           </a:xfrm>
           <a:prstGeom prst="rect">
@@ -3236,7 +3231,7 @@
         </p:nvSpPr>
         <p:spPr>
           <a:xfrm>
-            <a:off x="2402763" y="2976154"/>
+            <a:off x="2569917" y="2743018"/>
             <a:ext cx="838200" cy="304800"/>
           </a:xfrm>
           <a:prstGeom prst="rect">
@@ -3276,7 +3271,7 @@
         </p:nvSpPr>
         <p:spPr>
           <a:xfrm>
-            <a:off x="2402764" y="2606822"/>
+            <a:off x="2569918" y="2373686"/>
             <a:ext cx="806631" cy="369332"/>
           </a:xfrm>
           <a:prstGeom prst="rect">
@@ -3305,7 +3300,7 @@
         </p:nvSpPr>
         <p:spPr>
           <a:xfrm>
-            <a:off x="6207621" y="2976154"/>
+            <a:off x="6374775" y="2743018"/>
             <a:ext cx="838200" cy="304800"/>
           </a:xfrm>
           <a:prstGeom prst="rect">
@@ -3345,7 +3340,7 @@
         </p:nvSpPr>
         <p:spPr>
           <a:xfrm>
-            <a:off x="6268292" y="2606822"/>
+            <a:off x="6435446" y="2373686"/>
             <a:ext cx="806631" cy="369332"/>
           </a:xfrm>
           <a:prstGeom prst="rect">
@@ -3374,7 +3369,7 @@
         </p:nvSpPr>
         <p:spPr>
           <a:xfrm>
-            <a:off x="2123988" y="3962400"/>
+            <a:off x="2291142" y="3729264"/>
             <a:ext cx="1395753" cy="2209800"/>
           </a:xfrm>
           <a:prstGeom prst="ellipse">
@@ -3420,7 +3415,7 @@
         </p:nvSpPr>
         <p:spPr>
           <a:xfrm>
-            <a:off x="5928846" y="3962400"/>
+            <a:off x="6096000" y="3729264"/>
             <a:ext cx="1395753" cy="2209800"/>
           </a:xfrm>
           <a:prstGeom prst="ellipse">
@@ -3466,7 +3461,7 @@
         </p:nvSpPr>
         <p:spPr>
           <a:xfrm>
-            <a:off x="3975760" y="3280954"/>
+            <a:off x="4142914" y="3047818"/>
             <a:ext cx="914400" cy="914400"/>
           </a:xfrm>
           <a:prstGeom prst="ellipse">
@@ -3516,7 +3511,7 @@
         </p:nvSpPr>
         <p:spPr>
           <a:xfrm>
-            <a:off x="3975760" y="4423954"/>
+            <a:off x="4142914" y="4190818"/>
             <a:ext cx="914400" cy="914400"/>
           </a:xfrm>
           <a:prstGeom prst="ellipse">
@@ -3565,7 +3560,7 @@
         </p:nvSpPr>
         <p:spPr>
           <a:xfrm>
-            <a:off x="3975760" y="5566954"/>
+            <a:off x="4142914" y="5333818"/>
             <a:ext cx="914400" cy="914400"/>
           </a:xfrm>
           <a:prstGeom prst="ellipse">
@@ -3614,7 +3609,7 @@
         </p:nvSpPr>
         <p:spPr>
           <a:xfrm>
-            <a:off x="8214657" y="5566954"/>
+            <a:off x="8381811" y="5333818"/>
             <a:ext cx="914400" cy="914400"/>
           </a:xfrm>
           <a:prstGeom prst="ellipse">
@@ -3663,7 +3658,7 @@
         </p:nvSpPr>
         <p:spPr>
           <a:xfrm>
-            <a:off x="8168937" y="4423954"/>
+            <a:off x="8336091" y="4190818"/>
             <a:ext cx="914400" cy="914400"/>
           </a:xfrm>
           <a:prstGeom prst="ellipse">
@@ -3712,7 +3707,7 @@
         </p:nvSpPr>
         <p:spPr>
           <a:xfrm>
-            <a:off x="8147166" y="2771894"/>
+            <a:off x="8314320" y="2538758"/>
             <a:ext cx="914400" cy="914400"/>
           </a:xfrm>
           <a:prstGeom prst="ellipse">
@@ -3762,7 +3757,7 @@
         </p:nvSpPr>
         <p:spPr>
           <a:xfrm>
-            <a:off x="9468691" y="3381494"/>
+            <a:off x="9635845" y="3148358"/>
             <a:ext cx="914400" cy="914400"/>
           </a:xfrm>
           <a:prstGeom prst="ellipse">
@@ -3812,7 +3807,7 @@
         </p:nvSpPr>
         <p:spPr>
           <a:xfrm>
-            <a:off x="2402763" y="4495800"/>
+            <a:off x="2569917" y="4262664"/>
             <a:ext cx="838200" cy="1223554"/>
           </a:xfrm>
           <a:prstGeom prst="rect">
@@ -3852,7 +3847,7 @@
         </p:nvSpPr>
         <p:spPr>
           <a:xfrm>
-            <a:off x="6207622" y="4495800"/>
+            <a:off x="6374776" y="4262664"/>
             <a:ext cx="838200" cy="1223554"/>
           </a:xfrm>
           <a:prstGeom prst="rect">
@@ -3892,7 +3887,7 @@
         </p:nvCxnSpPr>
         <p:spPr>
           <a:xfrm>
-            <a:off x="2402763" y="4881154"/>
+            <a:off x="2569917" y="4648018"/>
             <a:ext cx="838200" cy="0"/>
           </a:xfrm>
           <a:prstGeom prst="line">
@@ -3927,7 +3922,7 @@
         </p:nvCxnSpPr>
         <p:spPr>
           <a:xfrm>
-            <a:off x="2402763" y="5329645"/>
+            <a:off x="2569917" y="5096509"/>
             <a:ext cx="838200" cy="0"/>
           </a:xfrm>
           <a:prstGeom prst="line">
@@ -3962,7 +3957,7 @@
         </p:nvCxnSpPr>
         <p:spPr>
           <a:xfrm>
-            <a:off x="6207621" y="5329645"/>
+            <a:off x="6374775" y="5096509"/>
             <a:ext cx="838200" cy="0"/>
           </a:xfrm>
           <a:prstGeom prst="line">
@@ -3997,7 +3992,7 @@
         </p:nvCxnSpPr>
         <p:spPr>
           <a:xfrm>
-            <a:off x="6207622" y="4894217"/>
+            <a:off x="6374776" y="4661081"/>
             <a:ext cx="838200" cy="0"/>
           </a:xfrm>
           <a:prstGeom prst="line">
@@ -4035,7 +4030,7 @@
         </p:nvCxnSpPr>
         <p:spPr>
           <a:xfrm>
-            <a:off x="2821864" y="3280954"/>
+            <a:off x="2989018" y="3047818"/>
             <a:ext cx="1" cy="681446"/>
           </a:xfrm>
           <a:prstGeom prst="straightConnector1">
@@ -4071,7 +4066,7 @@
         </p:nvCxnSpPr>
         <p:spPr>
           <a:xfrm>
-            <a:off x="6626722" y="3280954"/>
+            <a:off x="6793876" y="3047818"/>
             <a:ext cx="1" cy="681446"/>
           </a:xfrm>
           <a:prstGeom prst="straightConnector1">
@@ -4104,7 +4099,7 @@
         </p:nvCxnSpPr>
         <p:spPr>
           <a:xfrm flipV="1">
-            <a:off x="2821864" y="3962400"/>
+            <a:off x="2989018" y="3729264"/>
             <a:ext cx="1153896" cy="766354"/>
           </a:xfrm>
           <a:prstGeom prst="straightConnector1">
@@ -4144,7 +4139,7 @@
         </p:nvCxnSpPr>
         <p:spPr>
           <a:xfrm flipV="1">
-            <a:off x="2821864" y="4881154"/>
+            <a:off x="2989018" y="4648018"/>
             <a:ext cx="1153896" cy="239486"/>
           </a:xfrm>
           <a:prstGeom prst="straightConnector1">
@@ -4182,7 +4177,7 @@
         </p:nvCxnSpPr>
         <p:spPr>
           <a:xfrm>
-            <a:off x="2821864" y="5512526"/>
+            <a:off x="2989018" y="5279390"/>
             <a:ext cx="1153896" cy="359229"/>
           </a:xfrm>
           <a:prstGeom prst="straightConnector1">
@@ -4222,7 +4217,7 @@
         </p:nvCxnSpPr>
         <p:spPr>
           <a:xfrm flipV="1">
-            <a:off x="6626723" y="3838694"/>
+            <a:off x="6793877" y="3605558"/>
             <a:ext cx="2841969" cy="890060"/>
           </a:xfrm>
           <a:prstGeom prst="straightConnector1">
@@ -4262,7 +4257,7 @@
         </p:nvCxnSpPr>
         <p:spPr>
           <a:xfrm flipV="1">
-            <a:off x="6589705" y="4881154"/>
+            <a:off x="6756859" y="4648018"/>
             <a:ext cx="1579232" cy="239486"/>
           </a:xfrm>
           <a:prstGeom prst="straightConnector1">
@@ -4300,7 +4295,7 @@
         </p:nvCxnSpPr>
         <p:spPr>
           <a:xfrm>
-            <a:off x="6626721" y="5512526"/>
+            <a:off x="6793875" y="5279390"/>
             <a:ext cx="1587936" cy="359229"/>
           </a:xfrm>
           <a:prstGeom prst="straightConnector1">
@@ -4407,7 +4402,7 @@
             </a:r>
             <a:r>
               <a:rPr lang="en-US" dirty="0"/>
-              <a:t> if, once initialized, it can not be changed (given a new value).</a:t>
+              <a:t> if, once initialized, it can not be changed.</a:t>
             </a:r>
           </a:p>
           <a:p>
@@ -4448,7 +4443,7 @@
             <a:pPr lvl="1"/>
             <a:r>
               <a:rPr lang="en-US" dirty="0"/>
-              <a:t>Easier to use objects in a multi-threaded program</a:t>
+              <a:t>Easier to use objects in a concurrent or parallel program</a:t>
             </a:r>
           </a:p>
           <a:p>
@@ -4531,7 +4526,7 @@
           <a:p>
             <a:r>
               <a:rPr lang="en-US" dirty="0"/>
-              <a:t>In a pure functional language, all data objects are immutable</a:t>
+              <a:t>In a purely functional language, all data objects are immutable</a:t>
             </a:r>
           </a:p>
           <a:p>
@@ -4545,17 +4540,13 @@
             <a:pPr lvl="1"/>
             <a:r>
               <a:rPr lang="en-US" dirty="0"/>
-              <a:t>Enables the advantages; explains the strangeness.</a:t>
-            </a:r>
-          </a:p>
-          <a:p>
-            <a:r>
-              <a:rPr lang="en-US" dirty="0" err="1"/>
-              <a:t>Oddnesses</a:t>
-            </a:r>
+              <a:t>Enables the advantages.</a:t>
+            </a:r>
+          </a:p>
+          <a:p>
             <a:r>
               <a:rPr lang="en-US" dirty="0"/>
-              <a:t>:</a:t>
+              <a:t>But:</a:t>
             </a:r>
           </a:p>
           <a:p>
@@ -4569,14 +4560,14 @@
             <a:pPr lvl="1"/>
             <a:r>
               <a:rPr lang="en-US" dirty="0"/>
-              <a:t>No loops (can’t update loop control variable)</a:t>
+              <a:t>No loops (can’t update loop control expression)</a:t>
             </a:r>
           </a:p>
           <a:p>
             <a:pPr lvl="1"/>
             <a:r>
               <a:rPr lang="en-US" dirty="0"/>
-              <a:t>No “in place” modifications. Changes are done by creating new objects instead.</a:t>
+              <a:t>No in-place modifications. Changes are done by creating new objects instead.</a:t>
             </a:r>
           </a:p>
         </p:txBody>
@@ -4650,7 +4641,7 @@
           <a:p>
             <a:r>
               <a:rPr lang="en-US" dirty="0"/>
-              <a:t>… Is an OO (imperative) functional hybrid.</a:t>
+              <a:t>… Is an object-oriented (and imperative) functional hybrid.</a:t>
             </a:r>
           </a:p>
           <a:p>
@@ -4774,14 +4765,14 @@
             <a:pPr lvl="1"/>
             <a:r>
               <a:rPr lang="en-US" dirty="0"/>
-              <a:t>Once bound, that label can not be used (in the same scope) to refer to a different value.</a:t>
+              <a:t>Once bound, that label cannot be used (in the same scope) to refer to a different value.</a:t>
             </a:r>
           </a:p>
           <a:p>
             <a:pPr lvl="2"/>
             <a:r>
               <a:rPr lang="en-US" dirty="0"/>
-              <a:t>Some languages (F#) do allow rebinding of names.</a:t>
+              <a:t>Some languages (F#, Rust) do allow rebinding of names.</a:t>
             </a:r>
           </a:p>
           <a:p>
@@ -5214,7 +5205,7 @@
         </p:nvSpPr>
         <p:spPr>
           <a:xfrm>
-            <a:off x="2057400" y="2209801"/>
+            <a:off x="1948542" y="1806554"/>
             <a:ext cx="2528256" cy="646331"/>
           </a:xfrm>
           <a:prstGeom prst="rect">
@@ -5262,7 +5253,7 @@
         </p:nvSpPr>
         <p:spPr>
           <a:xfrm>
-            <a:off x="2242457" y="3999411"/>
+            <a:off x="2133599" y="3596164"/>
             <a:ext cx="838200" cy="304800"/>
           </a:xfrm>
           <a:prstGeom prst="rect">
@@ -5302,7 +5293,7 @@
         </p:nvSpPr>
         <p:spPr>
           <a:xfrm>
-            <a:off x="4038600" y="3504111"/>
+            <a:off x="3929742" y="3100864"/>
             <a:ext cx="1371600" cy="1295400"/>
           </a:xfrm>
           <a:prstGeom prst="ellipse">
@@ -5354,7 +5345,7 @@
         </p:nvCxnSpPr>
         <p:spPr>
           <a:xfrm>
-            <a:off x="3080658" y="4151811"/>
+            <a:off x="2971800" y="3748564"/>
             <a:ext cx="957943" cy="0"/>
           </a:xfrm>
           <a:prstGeom prst="straightConnector1">
@@ -5387,7 +5378,7 @@
         </p:nvSpPr>
         <p:spPr>
           <a:xfrm>
-            <a:off x="2242458" y="3630079"/>
+            <a:off x="2133600" y="3226832"/>
             <a:ext cx="716863" cy="369332"/>
           </a:xfrm>
           <a:prstGeom prst="rect">
@@ -5416,7 +5407,7 @@
         </p:nvSpPr>
         <p:spPr>
           <a:xfrm>
-            <a:off x="6585857" y="4125379"/>
+            <a:off x="6476999" y="3722132"/>
             <a:ext cx="838200" cy="304800"/>
           </a:xfrm>
           <a:prstGeom prst="rect">
@@ -5456,7 +5447,7 @@
         </p:nvSpPr>
         <p:spPr>
           <a:xfrm>
-            <a:off x="8382000" y="3630079"/>
+            <a:off x="8273142" y="3226832"/>
             <a:ext cx="1371600" cy="1295400"/>
           </a:xfrm>
           <a:prstGeom prst="ellipse">
@@ -5508,7 +5499,7 @@
         </p:nvCxnSpPr>
         <p:spPr>
           <a:xfrm>
-            <a:off x="7424058" y="4277779"/>
+            <a:off x="7315200" y="3874532"/>
             <a:ext cx="1158809" cy="1280762"/>
           </a:xfrm>
           <a:prstGeom prst="straightConnector1">
@@ -5541,7 +5532,7 @@
         </p:nvSpPr>
         <p:spPr>
           <a:xfrm>
-            <a:off x="6585858" y="3756047"/>
+            <a:off x="6477000" y="3352800"/>
             <a:ext cx="716863" cy="369332"/>
           </a:xfrm>
           <a:prstGeom prst="rect">
@@ -5570,7 +5561,7 @@
         </p:nvSpPr>
         <p:spPr>
           <a:xfrm>
-            <a:off x="8382000" y="5368834"/>
+            <a:off x="8273142" y="4965587"/>
             <a:ext cx="1371600" cy="1295400"/>
           </a:xfrm>
           <a:prstGeom prst="ellipse">
@@ -5619,7 +5610,7 @@
         </p:nvSpPr>
         <p:spPr>
           <a:xfrm>
-            <a:off x="8652722" y="2486799"/>
+            <a:off x="8408503" y="2092087"/>
             <a:ext cx="1100879" cy="369332"/>
           </a:xfrm>
           <a:prstGeom prst="rect">
@@ -5651,8 +5642,8 @@
         </p:nvCxnSpPr>
         <p:spPr>
           <a:xfrm flipH="1">
-            <a:off x="9067801" y="2856131"/>
-            <a:ext cx="135361" cy="773948"/>
+            <a:off x="8958942" y="2461419"/>
+            <a:ext cx="1" cy="765413"/>
           </a:xfrm>
           <a:prstGeom prst="straightConnector1">
             <a:avLst/>
@@ -5740,8 +5731,8 @@
         </p:nvSpPr>
         <p:spPr>
           <a:xfrm>
-            <a:off x="1981200" y="1600201"/>
-            <a:ext cx="8229600" cy="2590800"/>
+            <a:off x="1562100" y="1699419"/>
+            <a:ext cx="9067800" cy="2590800"/>
           </a:xfrm>
         </p:spPr>
         <p:txBody>
@@ -5764,7 +5755,7 @@
             <a:pPr lvl="2"/>
             <a:r>
               <a:rPr lang="en-US" dirty="0"/>
-              <a:t>Methods that “change” a string really return a new string with the changed value.</a:t>
+              <a:t>Methods that appear to change a string really return a new string with the changed value.</a:t>
             </a:r>
           </a:p>
           <a:p>
@@ -5972,8 +5963,8 @@
         </p:nvSpPr>
         <p:spPr>
           <a:xfrm>
-            <a:off x="1981200" y="1600200"/>
-            <a:ext cx="8229600" cy="1905000"/>
+            <a:off x="1524000" y="1669664"/>
+            <a:ext cx="9144000" cy="1905000"/>
           </a:xfrm>
         </p:spPr>
         <p:txBody>

</xml_diff>